<commit_message>
changes in gnl + added pptx + start using GNL
</commit_message>
<xml_diff>
--- a/Схема выполнения.pptx
+++ b/Схема выполнения.pptx
@@ -10,6 +10,7 @@
     <p:sldId id="257" r:id="rId4"/>
     <p:sldId id="259" r:id="rId5"/>
     <p:sldId id="260" r:id="rId6"/>
+    <p:sldId id="261" r:id="rId7"/>
   </p:sldIdLst>
   <p:sldSz cx="12192000" cy="6858000"/>
   <p:notesSz cx="6858000" cy="9144000"/>
@@ -3612,7 +3613,7 @@
           <a:p>
             <a:r>
               <a:rPr lang="en-US" dirty="0"/>
-              <a:t>Part 1. Checker</a:t>
+              <a:t>Using of get next line</a:t>
             </a:r>
             <a:endParaRPr lang="ru-RU" dirty="0"/>
           </a:p>
@@ -3634,11 +3635,95 @@
             <p:ph idx="1"/>
           </p:nvPr>
         </p:nvSpPr>
-        <p:spPr/>
-        <p:txBody>
-          <a:bodyPr/>
-          <a:lstStyle/>
-          <a:p>
+        <p:spPr>
+          <a:xfrm>
+            <a:off x="838200" y="1836511"/>
+            <a:ext cx="10515600" cy="4351338"/>
+          </a:xfrm>
+        </p:spPr>
+        <p:txBody>
+          <a:bodyPr/>
+          <a:lstStyle/>
+          <a:p>
+            <a:r>
+              <a:rPr lang="en-US" dirty="0"/>
+              <a:t>Should be created a new branch in GNL repo</a:t>
+            </a:r>
+          </a:p>
+          <a:p>
+            <a:r>
+              <a:rPr lang="en-US" dirty="0"/>
+              <a:t>Stdin file descriptor is defined in &lt;</a:t>
+            </a:r>
+            <a:r>
+              <a:rPr lang="en-US" dirty="0" err="1"/>
+              <a:t>unistd.h</a:t>
+            </a:r>
+            <a:r>
+              <a:rPr lang="en-US" dirty="0"/>
+              <a:t>&gt; as symbolic constant </a:t>
+            </a:r>
+            <a:r>
+              <a:rPr lang="en" dirty="0"/>
+              <a:t>STDIN_FILENO</a:t>
+            </a:r>
+          </a:p>
+          <a:p>
+            <a:r>
+              <a:rPr lang="en-US" dirty="0"/>
+              <a:t>We should read from </a:t>
+            </a:r>
+            <a:r>
+              <a:rPr lang="en-US" b="1" dirty="0"/>
+              <a:t>STDIN_FILENO</a:t>
+            </a:r>
+          </a:p>
+          <a:p>
+            <a:r>
+              <a:rPr lang="en-US" dirty="0"/>
+              <a:t>For the economy I should rename </a:t>
+            </a:r>
+            <a:r>
+              <a:rPr lang="en-US" b="1" dirty="0" err="1"/>
+              <a:t>get_next_line</a:t>
+            </a:r>
+            <a:r>
+              <a:rPr lang="en-US" dirty="0"/>
+              <a:t> in </a:t>
+            </a:r>
+            <a:r>
+              <a:rPr lang="en-US" b="1" dirty="0" err="1"/>
+              <a:t>getNL</a:t>
+            </a:r>
+            <a:endParaRPr lang="en-US" b="1" dirty="0"/>
+          </a:p>
+          <a:p>
+            <a:r>
+              <a:rPr lang="en-US" dirty="0"/>
+              <a:t>What is the best meaning of </a:t>
+            </a:r>
+            <a:r>
+              <a:rPr lang="en-US" b="1" dirty="0"/>
+              <a:t>BUFF_SIZE</a:t>
+            </a:r>
+            <a:r>
+              <a:rPr lang="en-US" dirty="0"/>
+              <a:t> variable? Suppose, </a:t>
+            </a:r>
+            <a:r>
+              <a:rPr lang="en-US" b="1" dirty="0"/>
+              <a:t>2</a:t>
+            </a:r>
+            <a:r>
+              <a:rPr lang="en-US" dirty="0"/>
+              <a:t>.</a:t>
+            </a:r>
+          </a:p>
+          <a:p>
+            <a:r>
+              <a:rPr lang="en-US" dirty="0"/>
+              <a:t>I should define a pointer to char where will store the result of GNL</a:t>
+            </a:r>
             <a:endParaRPr lang="ru-RU" dirty="0"/>
           </a:p>
         </p:txBody>
@@ -3647,6 +3732,140 @@
     <p:extLst>
       <p:ext uri="{BB962C8B-B14F-4D97-AF65-F5344CB8AC3E}">
         <p14:creationId xmlns:p14="http://schemas.microsoft.com/office/powerpoint/2010/main" val="2557595454"/>
+      </p:ext>
+    </p:extLst>
+  </p:cSld>
+  <p:clrMapOvr>
+    <a:masterClrMapping/>
+  </p:clrMapOvr>
+</p:sld>
+</file>
+
+<file path=ppt/slides/slide6.xml><?xml version="1.0" encoding="utf-8"?>
+<p:sld xmlns:a="http://schemas.openxmlformats.org/drawingml/2006/main" xmlns:r="http://schemas.openxmlformats.org/officeDocument/2006/relationships" xmlns:p="http://schemas.openxmlformats.org/presentationml/2006/main">
+  <p:cSld>
+    <p:spTree>
+      <p:nvGrpSpPr>
+        <p:cNvPr id="1" name=""/>
+        <p:cNvGrpSpPr/>
+        <p:nvPr/>
+      </p:nvGrpSpPr>
+      <p:grpSpPr>
+        <a:xfrm>
+          <a:off x="0" y="0"/>
+          <a:ext cx="0" cy="0"/>
+          <a:chOff x="0" y="0"/>
+          <a:chExt cx="0" cy="0"/>
+        </a:xfrm>
+      </p:grpSpPr>
+      <p:sp>
+        <p:nvSpPr>
+          <p:cNvPr id="2" name="Заголовок 1">
+            <a:extLst>
+              <a:ext uri="{FF2B5EF4-FFF2-40B4-BE49-F238E27FC236}">
+                <a16:creationId xmlns:a16="http://schemas.microsoft.com/office/drawing/2014/main" id="{1D13F7C6-DCBB-414C-BFED-0875635DC46E}"/>
+              </a:ext>
+            </a:extLst>
+          </p:cNvPr>
+          <p:cNvSpPr>
+            <a:spLocks noGrp="1"/>
+          </p:cNvSpPr>
+          <p:nvPr>
+            <p:ph type="title"/>
+          </p:nvPr>
+        </p:nvSpPr>
+        <p:spPr/>
+        <p:txBody>
+          <a:bodyPr/>
+          <a:lstStyle/>
+          <a:p>
+            <a:r>
+              <a:rPr lang="en-US" dirty="0"/>
+              <a:t>Possible problems with get next line</a:t>
+            </a:r>
+            <a:endParaRPr lang="ru-RU" dirty="0"/>
+          </a:p>
+        </p:txBody>
+      </p:sp>
+      <p:sp>
+        <p:nvSpPr>
+          <p:cNvPr id="3" name="Объект 2">
+            <a:extLst>
+              <a:ext uri="{FF2B5EF4-FFF2-40B4-BE49-F238E27FC236}">
+                <a16:creationId xmlns:a16="http://schemas.microsoft.com/office/drawing/2014/main" id="{DE421272-597F-DA43-AA2D-37410AF9EB37}"/>
+              </a:ext>
+            </a:extLst>
+          </p:cNvPr>
+          <p:cNvSpPr>
+            <a:spLocks noGrp="1"/>
+          </p:cNvSpPr>
+          <p:nvPr>
+            <p:ph idx="1"/>
+          </p:nvPr>
+        </p:nvSpPr>
+        <p:spPr/>
+        <p:txBody>
+          <a:bodyPr/>
+          <a:lstStyle/>
+          <a:p>
+            <a:pPr marL="514350" indent="-514350">
+              <a:buFont typeface="+mj-lt"/>
+              <a:buAutoNum type="arabicPeriod"/>
+            </a:pPr>
+            <a:r>
+              <a:rPr lang="en-US" dirty="0"/>
+              <a:t>Memory leaks?</a:t>
+            </a:r>
+            <a:endParaRPr lang="en" dirty="0"/>
+          </a:p>
+          <a:p>
+            <a:pPr marL="914400" lvl="1" indent="-457200">
+              <a:buFont typeface="+mj-lt"/>
+              <a:buAutoNum type="arabicPeriod"/>
+            </a:pPr>
+            <a:r>
+              <a:rPr lang="en-US" dirty="0"/>
+              <a:t>In a subj defined ascension of memory leaks, but who knows…</a:t>
+            </a:r>
+          </a:p>
+          <a:p>
+            <a:pPr marL="514350" indent="-514350">
+              <a:buFont typeface="+mj-lt"/>
+              <a:buAutoNum type="arabicPeriod"/>
+            </a:pPr>
+            <a:r>
+              <a:rPr lang="en-US" dirty="0"/>
+              <a:t>Crashes with some parameters</a:t>
+            </a:r>
+          </a:p>
+          <a:p>
+            <a:pPr marL="971550" lvl="1" indent="-514350">
+              <a:buFont typeface="+mj-lt"/>
+              <a:buAutoNum type="arabicPeriod"/>
+            </a:pPr>
+            <a:r>
+              <a:rPr lang="en-US" dirty="0"/>
+              <a:t>Need </a:t>
+            </a:r>
+            <a:r>
+              <a:rPr lang="en-US"/>
+              <a:t>check it</a:t>
+            </a:r>
+            <a:endParaRPr lang="en-US" dirty="0"/>
+          </a:p>
+          <a:p>
+            <a:pPr marL="514350" indent="-514350">
+              <a:buFont typeface="+mj-lt"/>
+              <a:buAutoNum type="arabicPeriod"/>
+            </a:pPr>
+            <a:endParaRPr lang="en-US"/>
+          </a:p>
+        </p:txBody>
+      </p:sp>
+    </p:spTree>
+    <p:extLst>
+      <p:ext uri="{BB962C8B-B14F-4D97-AF65-F5344CB8AC3E}">
+        <p14:creationId xmlns:p14="http://schemas.microsoft.com/office/powerpoint/2010/main" val="921760492"/>
       </p:ext>
     </p:extLst>
   </p:cSld>

</xml_diff>